<commit_message>
last angular hands on
</commit_message>
<xml_diff>
--- a/Week5/Day4/W5D4.pptx
+++ b/Week5/Day4/W5D4.pptx
@@ -5,7 +5,7 @@
     <p:sldMasterId id="2147483661" r:id="rId1"/>
   </p:sldMasterIdLst>
   <p:notesMasterIdLst>
-    <p:notesMasterId r:id="rId17"/>
+    <p:notesMasterId r:id="rId18"/>
   </p:notesMasterIdLst>
   <p:sldIdLst>
     <p:sldId id="256" r:id="rId2"/>
@@ -23,6 +23,7 @@
     <p:sldId id="268" r:id="rId14"/>
     <p:sldId id="269" r:id="rId15"/>
     <p:sldId id="270" r:id="rId16"/>
+    <p:sldId id="271" r:id="rId17"/>
   </p:sldIdLst>
   <p:sldSz cx="9144000" cy="6858000" type="screen4x3"/>
   <p:notesSz cx="7010400" cy="9296400"/>
@@ -255,6 +256,11 @@
       </a:defRPr>
     </a:lvl9pPr>
   </p:defaultTextStyle>
+  <p:extLst>
+    <p:ext uri="{EFAFB233-063F-42B5-8137-9DF3F51BA10A}">
+      <p15:sldGuideLst xmlns:p15="http://schemas.microsoft.com/office/powerpoint/2012/main"/>
+    </p:ext>
+  </p:extLst>
 </p:presentation>
 </file>
 
@@ -28677,6 +28683,187 @@
 </p:sld>
 </file>
 
+<file path=ppt/slides/slide16.xml><?xml version="1.0" encoding="utf-8"?>
+<p:sld xmlns:a="http://schemas.openxmlformats.org/drawingml/2006/main" xmlns:r="http://schemas.openxmlformats.org/officeDocument/2006/relationships" xmlns:p="http://schemas.openxmlformats.org/presentationml/2006/main">
+  <p:cSld>
+    <p:spTree>
+      <p:nvGrpSpPr>
+        <p:cNvPr id="1" name=""/>
+        <p:cNvGrpSpPr/>
+        <p:nvPr/>
+      </p:nvGrpSpPr>
+      <p:grpSpPr>
+        <a:xfrm>
+          <a:off x="0" y="0"/>
+          <a:ext cx="0" cy="0"/>
+          <a:chOff x="0" y="0"/>
+          <a:chExt cx="0" cy="0"/>
+        </a:xfrm>
+      </p:grpSpPr>
+      <p:sp>
+        <p:nvSpPr>
+          <p:cNvPr id="2" name="Title 1">
+            <a:extLst>
+              <a:ext uri="{FF2B5EF4-FFF2-40B4-BE49-F238E27FC236}">
+                <a16:creationId xmlns:a16="http://schemas.microsoft.com/office/drawing/2014/main" id="{3FC30F96-5344-4AFD-A3D1-8C854960B0DD}"/>
+              </a:ext>
+            </a:extLst>
+          </p:cNvPr>
+          <p:cNvSpPr>
+            <a:spLocks noGrp="1"/>
+          </p:cNvSpPr>
+          <p:nvPr>
+            <p:ph type="title"/>
+          </p:nvPr>
+        </p:nvSpPr>
+        <p:spPr/>
+        <p:txBody>
+          <a:bodyPr/>
+          <a:lstStyle/>
+          <a:p>
+            <a:r>
+              <a:rPr lang="en-US" dirty="0"/>
+              <a:t>Angular Hands on: The final boss</a:t>
+            </a:r>
+          </a:p>
+        </p:txBody>
+      </p:sp>
+      <p:sp>
+        <p:nvSpPr>
+          <p:cNvPr id="3" name="Text Placeholder 2">
+            <a:extLst>
+              <a:ext uri="{FF2B5EF4-FFF2-40B4-BE49-F238E27FC236}">
+                <a16:creationId xmlns:a16="http://schemas.microsoft.com/office/drawing/2014/main" id="{37B8DC6B-3761-42AC-9788-D85CB9890A2E}"/>
+              </a:ext>
+            </a:extLst>
+          </p:cNvPr>
+          <p:cNvSpPr>
+            <a:spLocks noGrp="1"/>
+          </p:cNvSpPr>
+          <p:nvPr>
+            <p:ph type="body" idx="1"/>
+          </p:nvPr>
+        </p:nvSpPr>
+        <p:spPr/>
+        <p:txBody>
+          <a:bodyPr/>
+          <a:lstStyle/>
+          <a:p>
+            <a:r>
+              <a:rPr lang="en-US" dirty="0"/>
+              <a:t>Create a new angular application</a:t>
+            </a:r>
+          </a:p>
+          <a:p>
+            <a:r>
+              <a:rPr lang="en-US" dirty="0"/>
+              <a:t>Create a component to take in user input</a:t>
+            </a:r>
+          </a:p>
+          <a:p>
+            <a:r>
+              <a:rPr lang="en-US" dirty="0"/>
+              <a:t>Take the user input, and send an http request to the </a:t>
+            </a:r>
+            <a:r>
+              <a:rPr lang="en-US" dirty="0" err="1"/>
+              <a:t>pokemon</a:t>
+            </a:r>
+            <a:r>
+              <a:rPr lang="en-US" dirty="0"/>
+              <a:t> </a:t>
+            </a:r>
+            <a:r>
+              <a:rPr lang="en-US" dirty="0" err="1"/>
+              <a:t>api</a:t>
+            </a:r>
+            <a:r>
+              <a:rPr lang="en-US" dirty="0"/>
+              <a:t> with a service</a:t>
+            </a:r>
+          </a:p>
+          <a:p>
+            <a:pPr lvl="1"/>
+            <a:r>
+              <a:rPr lang="en-US" dirty="0"/>
+              <a:t>This is the same </a:t>
+            </a:r>
+            <a:r>
+              <a:rPr lang="en-US" dirty="0" err="1"/>
+              <a:t>pokeapi</a:t>
+            </a:r>
+            <a:r>
+              <a:rPr lang="en-US" dirty="0"/>
+              <a:t> from week 3</a:t>
+            </a:r>
+          </a:p>
+          <a:p>
+            <a:r>
+              <a:rPr lang="en-US" dirty="0"/>
+              <a:t>Display the name and an image of the </a:t>
+            </a:r>
+            <a:r>
+              <a:rPr lang="en-US" dirty="0" err="1"/>
+              <a:t>pokemon</a:t>
+            </a:r>
+            <a:r>
+              <a:rPr lang="en-US" dirty="0"/>
+              <a:t> queried inside of a component in your application</a:t>
+            </a:r>
+          </a:p>
+        </p:txBody>
+      </p:sp>
+      <p:sp>
+        <p:nvSpPr>
+          <p:cNvPr id="4" name="Slide Number Placeholder 3">
+            <a:extLst>
+              <a:ext uri="{FF2B5EF4-FFF2-40B4-BE49-F238E27FC236}">
+                <a16:creationId xmlns:a16="http://schemas.microsoft.com/office/drawing/2014/main" id="{CC881C5C-F377-456C-B4B3-AEEAF6CC093A}"/>
+              </a:ext>
+            </a:extLst>
+          </p:cNvPr>
+          <p:cNvSpPr>
+            <a:spLocks noGrp="1"/>
+          </p:cNvSpPr>
+          <p:nvPr>
+            <p:ph type="sldNum" idx="12"/>
+          </p:nvPr>
+        </p:nvSpPr>
+        <p:spPr/>
+        <p:txBody>
+          <a:bodyPr/>
+          <a:lstStyle/>
+          <a:p>
+            <a:pPr marL="0" lvl="0" indent="0" algn="r" rtl="0">
+              <a:spcBef>
+                <a:spcPts val="0"/>
+              </a:spcBef>
+              <a:spcAft>
+                <a:spcPts val="0"/>
+              </a:spcAft>
+              <a:buNone/>
+            </a:pPr>
+            <a:fld id="{00000000-1234-1234-1234-123412341234}" type="slidenum">
+              <a:rPr lang="en-US" smtClean="0"/>
+              <a:t>15</a:t>
+            </a:fld>
+            <a:endParaRPr lang="en-US"/>
+          </a:p>
+        </p:txBody>
+      </p:sp>
+    </p:spTree>
+    <p:extLst>
+      <p:ext uri="{BB962C8B-B14F-4D97-AF65-F5344CB8AC3E}">
+        <p14:creationId xmlns:p14="http://schemas.microsoft.com/office/powerpoint/2010/main" val="1220375824"/>
+      </p:ext>
+    </p:extLst>
+  </p:cSld>
+  <p:clrMapOvr>
+    <a:masterClrMapping/>
+  </p:clrMapOvr>
+</p:sld>
+</file>
+
 <file path=ppt/slides/slide2.xml><?xml version="1.0" encoding="utf-8"?>
 <p:sld xmlns:a="http://schemas.openxmlformats.org/drawingml/2006/main" xmlns:r="http://schemas.openxmlformats.org/officeDocument/2006/relationships" xmlns:p="http://schemas.openxmlformats.org/presentationml/2006/main">
   <p:cSld>

</xml_diff>